<commit_message>
added pivot table and changed inserts
</commit_message>
<xml_diff>
--- a/VPI_Presentation.pptx
+++ b/VPI_Presentation.pptx
@@ -5,10 +5,10 @@
     <p:sldMasterId id="2147483672" r:id="rId1"/>
   </p:sldMasterIdLst>
   <p:notesMasterIdLst>
-    <p:notesMasterId r:id="rId10"/>
+    <p:notesMasterId r:id="rId11"/>
   </p:notesMasterIdLst>
   <p:handoutMasterIdLst>
-    <p:handoutMasterId r:id="rId11"/>
+    <p:handoutMasterId r:id="rId12"/>
   </p:handoutMasterIdLst>
   <p:sldIdLst>
     <p:sldId id="257" r:id="rId2"/>
@@ -17,8 +17,9 @@
     <p:sldId id="272" r:id="rId5"/>
     <p:sldId id="274" r:id="rId6"/>
     <p:sldId id="275" r:id="rId7"/>
-    <p:sldId id="270" r:id="rId8"/>
-    <p:sldId id="266" r:id="rId9"/>
+    <p:sldId id="276" r:id="rId8"/>
+    <p:sldId id="270" r:id="rId9"/>
+    <p:sldId id="266" r:id="rId10"/>
   </p:sldIdLst>
   <p:sldSz cx="12192000" cy="6858000"/>
   <p:notesSz cx="6858000" cy="9144000"/>
@@ -281,7 +282,7 @@
                     <a:cs typeface="+mn-cs"/>
                   </a:defRPr>
                 </a:pPr>
-                <a:endParaRPr lang="de-DE"/>
+                <a:endParaRPr lang="en-US"/>
               </a:p>
             </c:txPr>
             <c:dLblPos val="outEnd"/>
@@ -714,7 +715,7 @@
                 <a:cs typeface="+mn-cs"/>
               </a:defRPr>
             </a:pPr>
-            <a:endParaRPr lang="de-DE"/>
+            <a:endParaRPr lang="en-US"/>
           </a:p>
         </c:txPr>
         <c:crossAx val="1677419711"/>
@@ -771,7 +772,7 @@
       <a:pPr>
         <a:defRPr/>
       </a:pPr>
-      <a:endParaRPr lang="de-DE"/>
+      <a:endParaRPr lang="en-US"/>
     </a:p>
   </c:txPr>
   <c:externalData r:id="rId3">
@@ -1428,7 +1429,7 @@
             <a:pPr rtl="0"/>
             <a:fld id="{1ABCE889-5300-44CA-AF06-6ED72F219EED}" type="datetime1">
               <a:rPr lang="de-DE" smtClean="0"/>
-              <a:t>04.11.2021</a:t>
+              <a:t>17.11.2021</a:t>
             </a:fld>
             <a:endParaRPr lang="de-DE" dirty="0"/>
           </a:p>
@@ -1598,7 +1599,7 @@
             <a:fld id="{35662C74-EDBE-4D4F-8A33-E12A32CC2B74}" type="datetime1">
               <a:rPr lang="de-DE" smtClean="0"/>
               <a:pPr/>
-              <a:t>04.11.2021</a:t>
+              <a:t>17.11.2021</a:t>
             </a:fld>
             <a:endParaRPr lang="de-DE" dirty="0"/>
           </a:p>
@@ -2022,7 +2023,7 @@
             <a:pPr rtl="0"/>
             <a:fld id="{5FD34AC2-3728-4A8B-B58F-6888FAEC3D20}" type="slidenum">
               <a:rPr lang="de-DE" smtClean="0"/>
-              <a:t>7</a:t>
+              <a:t>8</a:t>
             </a:fld>
             <a:endParaRPr lang="de-DE" dirty="0"/>
           </a:p>
@@ -2108,7 +2109,7 @@
             <a:pPr rtl="0"/>
             <a:fld id="{5FD34AC2-3728-4A8B-B58F-6888FAEC3D20}" type="slidenum">
               <a:rPr lang="de-DE" smtClean="0"/>
-              <a:t>8</a:t>
+              <a:t>9</a:t>
             </a:fld>
             <a:endParaRPr lang="de-DE" dirty="0"/>
           </a:p>
@@ -2261,7 +2262,7 @@
             <a:pPr rtl="0"/>
             <a:fld id="{BB5A12BF-D6F0-407A-AE7A-8865A691B30B}" type="datetime1">
               <a:rPr lang="de-DE" noProof="0" smtClean="0"/>
-              <a:t>04.11.2021</a:t>
+              <a:t>17.11.2021</a:t>
             </a:fld>
             <a:endParaRPr lang="de-DE" noProof="0" dirty="0"/>
           </a:p>
@@ -2523,7 +2524,7 @@
             <a:pPr rtl="0"/>
             <a:fld id="{875125CE-31DE-4DE5-8258-3A8744281D72}" type="datetime1">
               <a:rPr lang="de-DE" noProof="0" smtClean="0"/>
-              <a:t>04.11.2021</a:t>
+              <a:t>17.11.2021</a:t>
             </a:fld>
             <a:endParaRPr lang="de-DE" noProof="0" dirty="0"/>
           </a:p>
@@ -2697,7 +2698,7 @@
             <a:pPr rtl="0"/>
             <a:fld id="{4FBF0C91-9943-49A6-85A4-F3BF107E47AD}" type="datetime1">
               <a:rPr lang="de-DE" noProof="0" smtClean="0"/>
-              <a:t>04.11.2021</a:t>
+              <a:t>17.11.2021</a:t>
             </a:fld>
             <a:endParaRPr lang="de-DE" noProof="0" dirty="0"/>
           </a:p>
@@ -2881,7 +2882,7 @@
             <a:pPr rtl="0"/>
             <a:fld id="{8C5891E8-9E95-4467-BED0-F8AAEF8D9A9B}" type="datetime1">
               <a:rPr lang="de-DE" noProof="0" smtClean="0"/>
-              <a:t>04.11.2021</a:t>
+              <a:t>17.11.2021</a:t>
             </a:fld>
             <a:endParaRPr lang="de-DE" noProof="0" dirty="0"/>
           </a:p>
@@ -3055,7 +3056,7 @@
             <a:pPr rtl="0"/>
             <a:fld id="{854B212C-B905-4204-B62F-E8E06329BC54}" type="datetime1">
               <a:rPr lang="de-DE" noProof="0" smtClean="0"/>
-              <a:t>04.11.2021</a:t>
+              <a:t>17.11.2021</a:t>
             </a:fld>
             <a:endParaRPr lang="de-DE" noProof="0" dirty="0"/>
           </a:p>
@@ -3305,7 +3306,7 @@
             <a:pPr rtl="0"/>
             <a:fld id="{AA39DC7C-431C-49AD-8BEB-3A6A7CA96EC1}" type="datetime1">
               <a:rPr lang="de-DE" noProof="0" smtClean="0"/>
-              <a:t>04.11.2021</a:t>
+              <a:t>17.11.2021</a:t>
             </a:fld>
             <a:endParaRPr lang="de-DE" noProof="0" dirty="0"/>
           </a:p>
@@ -3541,7 +3542,7 @@
             <a:pPr rtl="0"/>
             <a:fld id="{7D20CEC8-C47B-464B-B000-FFFA0189EAE4}" type="datetime1">
               <a:rPr lang="de-DE" noProof="0" smtClean="0"/>
-              <a:t>04.11.2021</a:t>
+              <a:t>17.11.2021</a:t>
             </a:fld>
             <a:endParaRPr lang="de-DE" noProof="0" dirty="0"/>
           </a:p>
@@ -3912,7 +3913,7 @@
             <a:pPr rtl="0"/>
             <a:fld id="{179EF80A-F254-4098-A979-7AEEA24F30B2}" type="datetime1">
               <a:rPr lang="de-DE" noProof="0" smtClean="0"/>
-              <a:t>04.11.2021</a:t>
+              <a:t>17.11.2021</a:t>
             </a:fld>
             <a:endParaRPr lang="de-DE" noProof="0" dirty="0"/>
           </a:p>
@@ -4034,7 +4035,7 @@
             <a:pPr rtl="0"/>
             <a:fld id="{40D8D008-F6B9-467C-A7C0-1BAD5B61C03F}" type="datetime1">
               <a:rPr lang="de-DE" noProof="0" smtClean="0"/>
-              <a:t>04.11.2021</a:t>
+              <a:t>17.11.2021</a:t>
             </a:fld>
             <a:endParaRPr lang="de-DE" noProof="0" dirty="0"/>
           </a:p>
@@ -4132,7 +4133,7 @@
             <a:pPr rtl="0"/>
             <a:fld id="{A1647DEE-0284-46DC-9342-E8AD8D0E79B1}" type="datetime1">
               <a:rPr lang="de-DE" noProof="0" smtClean="0"/>
-              <a:t>04.11.2021</a:t>
+              <a:t>17.11.2021</a:t>
             </a:fld>
             <a:endParaRPr lang="de-DE" noProof="0" dirty="0"/>
           </a:p>
@@ -4439,7 +4440,7 @@
             <a:pPr rtl="0"/>
             <a:fld id="{A9A78B8A-98F5-4D5C-AF9C-09887B7C3520}" type="datetime1">
               <a:rPr lang="de-DE" noProof="0" smtClean="0"/>
-              <a:t>04.11.2021</a:t>
+              <a:t>17.11.2021</a:t>
             </a:fld>
             <a:endParaRPr lang="de-DE" noProof="0" dirty="0"/>
           </a:p>
@@ -5138,7 +5139,7 @@
             <a:pPr rtl="0"/>
             <a:fld id="{583FE5D3-80A0-435E-8B7C-8DB39401B58A}" type="datetime1">
               <a:rPr lang="de-DE" noProof="0" smtClean="0"/>
-              <a:t>04.11.2021</a:t>
+              <a:t>17.11.2021</a:t>
             </a:fld>
             <a:endParaRPr lang="de-DE" noProof="0" dirty="0"/>
           </a:p>
@@ -5353,7 +5354,7 @@
             <a:pPr rtl="0"/>
             <a:fld id="{EB2962B4-671A-4096-8CEA-B3061EA2E548}" type="datetime1">
               <a:rPr lang="de-DE" noProof="0" smtClean="0"/>
-              <a:t>04.11.2021</a:t>
+              <a:t>17.11.2021</a:t>
             </a:fld>
             <a:endParaRPr lang="de-DE" noProof="0" dirty="0"/>
           </a:p>
@@ -6877,7 +6878,15 @@
             </a:pPr>
             <a:r>
               <a:rPr lang="en-GB" dirty="0"/>
-              <a:t>CREATE TABLE fact (</a:t>
+              <a:t>CREATE TABLE </a:t>
+            </a:r>
+            <a:r>
+              <a:rPr lang="en-GB" dirty="0" err="1"/>
+              <a:t>fact_vpi</a:t>
+            </a:r>
+            <a:r>
+              <a:rPr lang="en-GB" dirty="0"/>
+              <a:t> (</a:t>
             </a:r>
           </a:p>
           <a:p>
@@ -6982,7 +6991,15 @@
             </a:pPr>
             <a:r>
               <a:rPr lang="en-GB" dirty="0"/>
-              <a:t>    fact (</a:t>
+              <a:t>    </a:t>
+            </a:r>
+            <a:r>
+              <a:rPr lang="en-GB" dirty="0" err="1"/>
+              <a:t>fact_vpi</a:t>
+            </a:r>
+            <a:r>
+              <a:rPr lang="en-GB" dirty="0"/>
+              <a:t> (</a:t>
             </a:r>
           </a:p>
           <a:p>
@@ -7032,7 +7049,15 @@
             </a:pPr>
             <a:r>
               <a:rPr lang="en-GB" dirty="0"/>
-              <a:t>ALTER TABLE fact ADD CONSTRAINT </a:t>
+              <a:t>ALTER TABLE </a:t>
+            </a:r>
+            <a:r>
+              <a:rPr lang="en-GB" dirty="0" err="1"/>
+              <a:t>fact_vpi</a:t>
+            </a:r>
+            <a:r>
+              <a:rPr lang="en-GB" dirty="0"/>
+              <a:t> ADD CONSTRAINT </a:t>
             </a:r>
             <a:r>
               <a:rPr lang="en-GB" dirty="0" err="1"/>
@@ -7042,15 +7067,6 @@
               <a:rPr lang="en-GB" dirty="0"/>
               <a:t> PRIMARY KEY ( id );</a:t>
             </a:r>
-          </a:p>
-          <a:p>
-            <a:pPr marL="0" indent="0">
-              <a:spcBef>
-                <a:spcPts val="600"/>
-              </a:spcBef>
-              <a:buNone/>
-            </a:pPr>
-            <a:endParaRPr lang="en-GB" dirty="0"/>
           </a:p>
         </p:txBody>
       </p:sp>
@@ -7123,7 +7139,15 @@
             </a:pPr>
             <a:r>
               <a:rPr lang="en-GB" dirty="0"/>
-              <a:t>CREATE TABLE time (</a:t>
+              <a:t>CREATE TABLE </a:t>
+            </a:r>
+            <a:r>
+              <a:rPr lang="en-GB" dirty="0" err="1"/>
+              <a:t>time_vpi</a:t>
+            </a:r>
+            <a:r>
+              <a:rPr lang="en-GB" dirty="0"/>
+              <a:t> (</a:t>
             </a:r>
           </a:p>
           <a:p>
@@ -7232,7 +7256,15 @@
             </a:pPr>
             <a:r>
               <a:rPr lang="en-GB" dirty="0"/>
-              <a:t>    time (</a:t>
+              <a:t>    </a:t>
+            </a:r>
+            <a:r>
+              <a:rPr lang="en-GB" dirty="0" err="1"/>
+              <a:t>time_vpi</a:t>
+            </a:r>
+            <a:r>
+              <a:rPr lang="en-GB" dirty="0"/>
+              <a:t> (</a:t>
             </a:r>
           </a:p>
           <a:p>
@@ -7282,7 +7314,15 @@
             </a:pPr>
             <a:r>
               <a:rPr lang="en-GB" dirty="0"/>
-              <a:t>ALTER TABLE time ADD CONSTRAINT </a:t>
+              <a:t>ALTER TABLE </a:t>
+            </a:r>
+            <a:r>
+              <a:rPr lang="en-GB" dirty="0" err="1"/>
+              <a:t>time_vpi</a:t>
+            </a:r>
+            <a:r>
+              <a:rPr lang="en-GB" dirty="0"/>
+              <a:t> ADD CONSTRAINT </a:t>
             </a:r>
             <a:r>
               <a:rPr lang="en-GB" dirty="0" err="1"/>
@@ -7582,7 +7622,7 @@
         </p:spPr>
         <p:txBody>
           <a:bodyPr>
-            <a:normAutofit fontScale="77500" lnSpcReduction="20000"/>
+            <a:normAutofit fontScale="55000" lnSpcReduction="20000"/>
           </a:bodyPr>
           <a:lstStyle/>
           <a:p>
@@ -7623,6 +7663,40 @@
             <a:pPr marL="0" indent="0">
               <a:buNone/>
             </a:pPr>
+            <a:r>
+              <a:rPr lang="en-US" dirty="0"/>
+              <a:t>drop SEQUENCE </a:t>
+            </a:r>
+            <a:r>
+              <a:rPr lang="en-US" dirty="0" err="1"/>
+              <a:t>fact_id_seq</a:t>
+            </a:r>
+            <a:r>
+              <a:rPr lang="en-US" dirty="0"/>
+              <a:t>;</a:t>
+            </a:r>
+          </a:p>
+          <a:p>
+            <a:pPr marL="0" indent="0">
+              <a:buNone/>
+            </a:pPr>
+            <a:r>
+              <a:rPr lang="en-US" dirty="0"/>
+              <a:t>drop SEQUENCE </a:t>
+            </a:r>
+            <a:r>
+              <a:rPr lang="en-US" dirty="0" err="1"/>
+              <a:t>time_id_seq</a:t>
+            </a:r>
+            <a:r>
+              <a:rPr lang="en-US" dirty="0"/>
+              <a:t>;</a:t>
+            </a:r>
+          </a:p>
+          <a:p>
+            <a:pPr marL="0" indent="0">
+              <a:buNone/>
+            </a:pPr>
             <a:endParaRPr lang="en-US" dirty="0"/>
           </a:p>
           <a:p>
@@ -7679,7 +7753,26 @@
             <a:pPr marL="0" indent="0">
               <a:buNone/>
             </a:pPr>
-            <a:endParaRPr lang="en-US" dirty="0"/>
+            <a:r>
+              <a:rPr lang="en-US" dirty="0"/>
+              <a:t>create SEQUENCE </a:t>
+            </a:r>
+            <a:r>
+              <a:rPr lang="en-US" dirty="0" err="1"/>
+              <a:t>fact_id_seq</a:t>
+            </a:r>
+            <a:r>
+              <a:rPr lang="en-US" dirty="0"/>
+              <a:t> </a:t>
+            </a:r>
+            <a:r>
+              <a:rPr lang="en-US" dirty="0" err="1"/>
+              <a:t>minvalue</a:t>
+            </a:r>
+            <a:r>
+              <a:rPr lang="en-US" dirty="0"/>
+              <a:t> 1 START with 1 increment by 1;</a:t>
+            </a:r>
           </a:p>
           <a:p>
             <a:pPr marL="0" indent="0">
@@ -7687,16 +7780,23 @@
             </a:pPr>
             <a:r>
               <a:rPr lang="en-US" dirty="0"/>
-              <a:t>truncate table fact cascade;</a:t>
-            </a:r>
-          </a:p>
-          <a:p>
-            <a:pPr marL="0" indent="0">
-              <a:buNone/>
-            </a:pPr>
+              <a:t>create SEQUENCE </a:t>
+            </a:r>
+            <a:r>
+              <a:rPr lang="en-US" dirty="0" err="1"/>
+              <a:t>time_id_seq</a:t>
+            </a:r>
             <a:r>
               <a:rPr lang="en-US" dirty="0"/>
-              <a:t>truncate table time cascade;</a:t>
+              <a:t> </a:t>
+            </a:r>
+            <a:r>
+              <a:rPr lang="en-US" dirty="0" err="1"/>
+              <a:t>minvalue</a:t>
+            </a:r>
+            <a:r>
+              <a:rPr lang="en-US" dirty="0"/>
+              <a:t> 1 START with 1 increment by 1;</a:t>
             </a:r>
           </a:p>
           <a:p>
@@ -7711,7 +7811,55 @@
             </a:pPr>
             <a:r>
               <a:rPr lang="en-US" dirty="0"/>
-              <a:t>insert into fact(id, </a:t>
+              <a:t>truncate table </a:t>
+            </a:r>
+            <a:r>
+              <a:rPr lang="en-US" dirty="0" err="1"/>
+              <a:t>fact_vpi</a:t>
+            </a:r>
+            <a:r>
+              <a:rPr lang="en-US" dirty="0"/>
+              <a:t> cascade;</a:t>
+            </a:r>
+          </a:p>
+          <a:p>
+            <a:pPr marL="0" indent="0">
+              <a:buNone/>
+            </a:pPr>
+            <a:r>
+              <a:rPr lang="en-US" dirty="0"/>
+              <a:t>truncate table </a:t>
+            </a:r>
+            <a:r>
+              <a:rPr lang="en-US" dirty="0" err="1"/>
+              <a:t>time_vpi</a:t>
+            </a:r>
+            <a:r>
+              <a:rPr lang="en-US" dirty="0"/>
+              <a:t> cascade;</a:t>
+            </a:r>
+          </a:p>
+          <a:p>
+            <a:pPr marL="0" indent="0">
+              <a:buNone/>
+            </a:pPr>
+            <a:endParaRPr lang="en-US" dirty="0"/>
+          </a:p>
+          <a:p>
+            <a:pPr marL="0" indent="0">
+              <a:buNone/>
+            </a:pPr>
+            <a:r>
+              <a:rPr lang="en-US" dirty="0"/>
+              <a:t>insert into </a:t>
+            </a:r>
+            <a:r>
+              <a:rPr lang="en-US" dirty="0" err="1"/>
+              <a:t>fact_vpi</a:t>
+            </a:r>
+            <a:r>
+              <a:rPr lang="en-US" dirty="0"/>
+              <a:t>(id, </a:t>
             </a:r>
             <a:r>
               <a:rPr lang="en-US" dirty="0" err="1"/>
@@ -7719,6 +7867,14 @@
             </a:r>
             <a:r>
               <a:rPr lang="en-US" dirty="0"/>
+              <a:t>, </a:t>
+            </a:r>
+            <a:r>
+              <a:rPr lang="en-US" dirty="0" err="1"/>
+              <a:t>time_id</a:t>
+            </a:r>
+            <a:r>
+              <a:rPr lang="en-US" dirty="0"/>
               <a:t>) select </a:t>
             </a:r>
             <a:r>
@@ -7735,6 +7891,14 @@
             </a:r>
             <a:r>
               <a:rPr lang="en-US" dirty="0"/>
+              <a:t>, </a:t>
+            </a:r>
+            <a:r>
+              <a:rPr lang="en-US" dirty="0" err="1"/>
+              <a:t>time_id_seq.nextval</a:t>
+            </a:r>
+            <a:r>
+              <a:rPr lang="en-US" dirty="0"/>
               <a:t> from </a:t>
             </a:r>
             <a:r>
@@ -7760,7 +7924,23 @@
             </a:pPr>
             <a:r>
               <a:rPr lang="en-US" dirty="0"/>
-              <a:t>insert into time(id, year, month) select </a:t>
+              <a:t>insert into </a:t>
+            </a:r>
+            <a:r>
+              <a:rPr lang="en-US" dirty="0" err="1"/>
+              <a:t>time_vpi</a:t>
+            </a:r>
+            <a:r>
+              <a:rPr lang="en-US" dirty="0"/>
+              <a:t>(id, year, month, </a:t>
+            </a:r>
+            <a:r>
+              <a:rPr lang="en-US" dirty="0" err="1"/>
+              <a:t>fact_id</a:t>
+            </a:r>
+            <a:r>
+              <a:rPr lang="en-US" dirty="0"/>
+              <a:t>) select </a:t>
             </a:r>
             <a:r>
               <a:rPr lang="en-US" dirty="0" err="1"/>
@@ -7781,6 +7961,14 @@
             <a:r>
               <a:rPr lang="en-US" dirty="0" err="1"/>
               <a:t>st.month</a:t>
+            </a:r>
+            <a:r>
+              <a:rPr lang="en-US" dirty="0"/>
+              <a:t>, </a:t>
+            </a:r>
+            <a:r>
+              <a:rPr lang="en-US" dirty="0" err="1"/>
+              <a:t>fact_id_seq.nextval</a:t>
             </a:r>
             <a:r>
               <a:rPr lang="en-US" dirty="0"/>
@@ -7819,6 +8007,270 @@
 </file>
 
 <file path=ppt/slides/slide7.xml><?xml version="1.0" encoding="utf-8"?>
+<p:sld xmlns:a="http://schemas.openxmlformats.org/drawingml/2006/main" xmlns:r="http://schemas.openxmlformats.org/officeDocument/2006/relationships" xmlns:p="http://schemas.openxmlformats.org/presentationml/2006/main">
+  <p:cSld>
+    <p:spTree>
+      <p:nvGrpSpPr>
+        <p:cNvPr id="1" name=""/>
+        <p:cNvGrpSpPr/>
+        <p:nvPr/>
+      </p:nvGrpSpPr>
+      <p:grpSpPr>
+        <a:xfrm>
+          <a:off x="0" y="0"/>
+          <a:ext cx="0" cy="0"/>
+          <a:chOff x="0" y="0"/>
+          <a:chExt cx="0" cy="0"/>
+        </a:xfrm>
+      </p:grpSpPr>
+      <p:sp>
+        <p:nvSpPr>
+          <p:cNvPr id="2" name="Titel 1">
+            <a:extLst>
+              <a:ext uri="{FF2B5EF4-FFF2-40B4-BE49-F238E27FC236}">
+                <a16:creationId xmlns:a16="http://schemas.microsoft.com/office/drawing/2014/main" id="{9143E6B3-46E5-43FF-B018-379910144BA6}"/>
+              </a:ext>
+            </a:extLst>
+          </p:cNvPr>
+          <p:cNvSpPr>
+            <a:spLocks noGrp="1"/>
+          </p:cNvSpPr>
+          <p:nvPr>
+            <p:ph type="title"/>
+          </p:nvPr>
+        </p:nvSpPr>
+        <p:spPr/>
+        <p:txBody>
+          <a:bodyPr/>
+          <a:lstStyle/>
+          <a:p>
+            <a:r>
+              <a:rPr lang="en-US" dirty="0"/>
+              <a:t>Pivot-Table</a:t>
+            </a:r>
+          </a:p>
+        </p:txBody>
+      </p:sp>
+      <p:sp>
+        <p:nvSpPr>
+          <p:cNvPr id="3" name="Inhaltsplatzhalter 2">
+            <a:extLst>
+              <a:ext uri="{FF2B5EF4-FFF2-40B4-BE49-F238E27FC236}">
+                <a16:creationId xmlns:a16="http://schemas.microsoft.com/office/drawing/2014/main" id="{5BD5D7AC-C7D5-4CD2-A3F2-D1B15DA13119}"/>
+              </a:ext>
+            </a:extLst>
+          </p:cNvPr>
+          <p:cNvSpPr>
+            <a:spLocks noGrp="1"/>
+          </p:cNvSpPr>
+          <p:nvPr>
+            <p:ph idx="1"/>
+          </p:nvPr>
+        </p:nvSpPr>
+        <p:spPr/>
+        <p:txBody>
+          <a:bodyPr>
+            <a:normAutofit fontScale="55000" lnSpcReduction="20000"/>
+          </a:bodyPr>
+          <a:lstStyle/>
+          <a:p>
+            <a:pPr marL="0" indent="0">
+              <a:buNone/>
+            </a:pPr>
+            <a:r>
+              <a:rPr lang="en-US" dirty="0"/>
+              <a:t>Select * from </a:t>
+            </a:r>
+          </a:p>
+          <a:p>
+            <a:pPr marL="0" indent="0">
+              <a:buNone/>
+            </a:pPr>
+            <a:r>
+              <a:rPr lang="en-US" dirty="0"/>
+              <a:t>(</a:t>
+            </a:r>
+          </a:p>
+          <a:p>
+            <a:pPr marL="0" indent="0">
+              <a:buNone/>
+            </a:pPr>
+            <a:r>
+              <a:rPr lang="en-US" dirty="0"/>
+              <a:t>Select </a:t>
+            </a:r>
+            <a:r>
+              <a:rPr lang="en-US" dirty="0" err="1"/>
+              <a:t>t.month</a:t>
+            </a:r>
+            <a:r>
+              <a:rPr lang="en-US" dirty="0"/>
+              <a:t>, </a:t>
+            </a:r>
+            <a:r>
+              <a:rPr lang="en-US" dirty="0" err="1"/>
+              <a:t>t.year</a:t>
+            </a:r>
+            <a:r>
+              <a:rPr lang="en-US" dirty="0"/>
+              <a:t>, </a:t>
+            </a:r>
+            <a:r>
+              <a:rPr lang="en-US" dirty="0" err="1"/>
+              <a:t>f.vpi</a:t>
+            </a:r>
+            <a:r>
+              <a:rPr lang="en-US" dirty="0"/>
+              <a:t> </a:t>
+            </a:r>
+          </a:p>
+          <a:p>
+            <a:pPr marL="0" indent="0">
+              <a:buNone/>
+            </a:pPr>
+            <a:r>
+              <a:rPr lang="en-US" dirty="0"/>
+              <a:t>from </a:t>
+            </a:r>
+            <a:r>
+              <a:rPr lang="en-US" dirty="0" err="1"/>
+              <a:t>time_vpi</a:t>
+            </a:r>
+            <a:r>
+              <a:rPr lang="en-US" dirty="0"/>
+              <a:t> t join </a:t>
+            </a:r>
+            <a:r>
+              <a:rPr lang="en-US" dirty="0" err="1"/>
+              <a:t>fact_vpi</a:t>
+            </a:r>
+            <a:r>
+              <a:rPr lang="en-US" dirty="0"/>
+              <a:t> f on (</a:t>
+            </a:r>
+            <a:r>
+              <a:rPr lang="en-US" dirty="0" err="1"/>
+              <a:t>f.time_id</a:t>
+            </a:r>
+            <a:r>
+              <a:rPr lang="en-US" dirty="0"/>
+              <a:t> = t.id))</a:t>
+            </a:r>
+          </a:p>
+          <a:p>
+            <a:pPr marL="0" indent="0">
+              <a:buNone/>
+            </a:pPr>
+            <a:r>
+              <a:rPr lang="en-US" dirty="0"/>
+              <a:t>pivot(</a:t>
+            </a:r>
+          </a:p>
+          <a:p>
+            <a:pPr marL="0" indent="0">
+              <a:buNone/>
+            </a:pPr>
+            <a:r>
+              <a:rPr lang="en-US" dirty="0"/>
+              <a:t>    avg(</a:t>
+            </a:r>
+            <a:r>
+              <a:rPr lang="en-US" dirty="0" err="1"/>
+              <a:t>vpi</a:t>
+            </a:r>
+            <a:r>
+              <a:rPr lang="en-US" dirty="0"/>
+              <a:t>)</a:t>
+            </a:r>
+          </a:p>
+          <a:p>
+            <a:pPr marL="0" indent="0">
+              <a:buNone/>
+            </a:pPr>
+            <a:r>
+              <a:rPr lang="en-US" dirty="0"/>
+              <a:t>    for year in ('1967', '1968', '1969',</a:t>
+            </a:r>
+          </a:p>
+          <a:p>
+            <a:pPr marL="0" indent="0">
+              <a:buNone/>
+            </a:pPr>
+            <a:r>
+              <a:rPr lang="en-US" dirty="0"/>
+              <a:t>                 '1970', '1971', '1972', '1973', '1974', '1975', '1976', '1977', '1978', '1979',</a:t>
+            </a:r>
+          </a:p>
+          <a:p>
+            <a:pPr marL="0" indent="0">
+              <a:buNone/>
+            </a:pPr>
+            <a:r>
+              <a:rPr lang="en-US" dirty="0"/>
+              <a:t>                 '1980', '1981', '1982', '1983', '1984', '1985', '1986', '1987', '1988', '1989',</a:t>
+            </a:r>
+          </a:p>
+          <a:p>
+            <a:pPr marL="0" indent="0">
+              <a:buNone/>
+            </a:pPr>
+            <a:r>
+              <a:rPr lang="en-US" dirty="0"/>
+              <a:t>                 '1990', '1991', '1992', '1993', '1994', '1995', '1996', '1997', '1998', '1999',</a:t>
+            </a:r>
+          </a:p>
+          <a:p>
+            <a:pPr marL="0" indent="0">
+              <a:buNone/>
+            </a:pPr>
+            <a:r>
+              <a:rPr lang="en-US" dirty="0"/>
+              <a:t>                 '2000', '2001', '2002', '2003', '2004', '2005', '2006', '2007', '2008', '2009',</a:t>
+            </a:r>
+          </a:p>
+          <a:p>
+            <a:pPr marL="0" indent="0">
+              <a:buNone/>
+            </a:pPr>
+            <a:r>
+              <a:rPr lang="en-US" dirty="0"/>
+              <a:t>                 '2010', '2011', '2012', '2013', '2014', '2015', '2016', '2017', '2018', '2019',</a:t>
+            </a:r>
+          </a:p>
+          <a:p>
+            <a:pPr marL="0" indent="0">
+              <a:buNone/>
+            </a:pPr>
+            <a:r>
+              <a:rPr lang="en-US" dirty="0"/>
+              <a:t>                 '2020', '2021')</a:t>
+            </a:r>
+          </a:p>
+          <a:p>
+            <a:pPr marL="0" indent="0">
+              <a:buNone/>
+            </a:pPr>
+            <a:r>
+              <a:rPr lang="en-US" dirty="0"/>
+              <a:t>);</a:t>
+            </a:r>
+          </a:p>
+        </p:txBody>
+      </p:sp>
+    </p:spTree>
+    <p:extLst>
+      <p:ext uri="{BB962C8B-B14F-4D97-AF65-F5344CB8AC3E}">
+        <p14:creationId xmlns:p14="http://schemas.microsoft.com/office/powerpoint/2010/main" val="818994111"/>
+      </p:ext>
+    </p:extLst>
+  </p:cSld>
+  <p:clrMapOvr>
+    <a:masterClrMapping/>
+  </p:clrMapOvr>
+</p:sld>
+</file>
+
+<file path=ppt/slides/slide8.xml><?xml version="1.0" encoding="utf-8"?>
 <p:sld xmlns:a="http://schemas.openxmlformats.org/drawingml/2006/main" xmlns:r="http://schemas.openxmlformats.org/officeDocument/2006/relationships" xmlns:p="http://schemas.openxmlformats.org/presentationml/2006/main">
   <p:cSld>
     <p:spTree>
@@ -8181,7 +8633,7 @@
 </p:sld>
 </file>
 
-<file path=ppt/slides/slide8.xml><?xml version="1.0" encoding="utf-8"?>
+<file path=ppt/slides/slide9.xml><?xml version="1.0" encoding="utf-8"?>
 <p:sld xmlns:a="http://schemas.openxmlformats.org/drawingml/2006/main" xmlns:r="http://schemas.openxmlformats.org/officeDocument/2006/relationships" xmlns:p="http://schemas.openxmlformats.org/presentationml/2006/main">
   <p:cSld>
     <p:spTree>

</xml_diff>